<commit_message>
updating web scrapping project
</commit_message>
<xml_diff>
--- a/Output/Project week 3.pptx
+++ b/Output/Project week 3.pptx
@@ -27315,76 +27315,33 @@
           </a:p>
         </p:txBody>
       </p:sp>
-      <p:sp>
-        <p:nvSpPr>
-          <p:cNvPr id="3" name="Espace réservé du contenu 2">
+      <p:pic>
+        <p:nvPicPr>
+          <p:cNvPr id="5" name="Espace réservé du contenu 4">
             <a:extLst>
               <a:ext uri="{FF2B5EF4-FFF2-40B4-BE49-F238E27FC236}">
-                <a16:creationId xmlns:a16="http://schemas.microsoft.com/office/drawing/2014/main" id="{73A2029E-23B3-49E4-97C5-1F7933C6BAC7}"/>
-              </a:ext>
-            </a:extLst>
-          </p:cNvPr>
-          <p:cNvSpPr>
-            <a:spLocks noGrp="1"/>
-          </p:cNvSpPr>
-          <p:nvPr>
-            <p:ph idx="1"/>
-          </p:nvPr>
-        </p:nvSpPr>
-        <p:spPr/>
-        <p:txBody>
-          <a:bodyPr/>
-          <a:lstStyle/>
-          <a:p>
-            <a:endParaRPr lang="fr-FR"/>
-          </a:p>
-        </p:txBody>
-      </p:sp>
-      <p:pic>
-        <p:nvPicPr>
-          <p:cNvPr id="1026" name="Picture 2">
-            <a:extLst>
-              <a:ext uri="{FF2B5EF4-FFF2-40B4-BE49-F238E27FC236}">
-                <a16:creationId xmlns:a16="http://schemas.microsoft.com/office/drawing/2014/main" id="{478F4FCA-7790-4AE1-81F8-AA8276732974}"/>
+                <a16:creationId xmlns:a16="http://schemas.microsoft.com/office/drawing/2014/main" id="{643B52C1-C79A-4CF1-9538-2C91A00BE9CD}"/>
               </a:ext>
             </a:extLst>
           </p:cNvPr>
           <p:cNvPicPr>
-            <a:picLocks noChangeAspect="1" noChangeArrowheads="1"/>
+            <a:picLocks noGrp="1" noChangeAspect="1"/>
           </p:cNvPicPr>
-          <p:nvPr/>
+          <p:nvPr>
+            <p:ph idx="1"/>
+          </p:nvPr>
         </p:nvPicPr>
         <p:blipFill>
-          <a:blip r:embed="rId2">
-            <a:extLst>
-              <a:ext uri="{28A0092B-C50C-407E-A947-70E740481C1C}">
-                <a14:useLocalDpi xmlns:a14="http://schemas.microsoft.com/office/drawing/2010/main" val="0"/>
-              </a:ext>
-            </a:extLst>
-          </a:blip>
-          <a:srcRect/>
+          <a:blip r:embed="rId2"/>
           <a:stretch>
             <a:fillRect/>
           </a:stretch>
         </p:blipFill>
-        <p:spPr bwMode="auto">
+        <p:spPr>
           <a:xfrm>
-            <a:off x="0" y="1657033"/>
-            <a:ext cx="12192000" cy="4935537"/>
+            <a:off x="-268225" y="1881632"/>
+            <a:ext cx="12728449" cy="4773168"/>
           </a:xfrm>
-          <a:prstGeom prst="rect">
-            <a:avLst/>
-          </a:prstGeom>
-          <a:noFill/>
-          <a:extLst>
-            <a:ext uri="{909E8E84-426E-40DD-AFC4-6F175D3DCCD1}">
-              <a14:hiddenFill xmlns:a14="http://schemas.microsoft.com/office/drawing/2010/main">
-                <a:solidFill>
-                  <a:srgbClr val="FFFFFF"/>
-                </a:solidFill>
-              </a14:hiddenFill>
-            </a:ext>
-          </a:extLst>
         </p:spPr>
       </p:pic>
     </p:spTree>
@@ -27459,10 +27416,10 @@
       </p:sp>
       <p:pic>
         <p:nvPicPr>
-          <p:cNvPr id="5" name="Espace réservé du contenu 4">
+          <p:cNvPr id="11" name="Espace réservé du contenu 10">
             <a:extLst>
               <a:ext uri="{FF2B5EF4-FFF2-40B4-BE49-F238E27FC236}">
-                <a16:creationId xmlns:a16="http://schemas.microsoft.com/office/drawing/2014/main" id="{659310D4-0D04-4BBB-AA27-5F5A9CD96259}"/>
+                <a16:creationId xmlns:a16="http://schemas.microsoft.com/office/drawing/2014/main" id="{7CAD3154-D95F-4EB6-A345-08A3D80BD4BD}"/>
               </a:ext>
             </a:extLst>
           </p:cNvPr>
@@ -27473,15 +27430,16 @@
             <p:ph idx="1"/>
           </p:nvPr>
         </p:nvPicPr>
-        <p:blipFill rotWithShape="1">
+        <p:blipFill>
           <a:blip r:embed="rId2"/>
-          <a:srcRect l="-580" r="580" b="8293"/>
-          <a:stretch/>
+          <a:stretch>
+            <a:fillRect/>
+          </a:stretch>
         </p:blipFill>
         <p:spPr>
           <a:xfrm>
-            <a:off x="1978914" y="1485900"/>
-            <a:ext cx="7810500" cy="5372100"/>
+            <a:off x="2160947" y="1584960"/>
+            <a:ext cx="7446433" cy="5584825"/>
           </a:xfrm>
         </p:spPr>
       </p:pic>
@@ -29211,10 +29169,10 @@
       </p:grpSp>
       <p:pic>
         <p:nvPicPr>
-          <p:cNvPr id="4" name="Image 3">
+          <p:cNvPr id="7" name="Image 6">
             <a:extLst>
               <a:ext uri="{FF2B5EF4-FFF2-40B4-BE49-F238E27FC236}">
-                <a16:creationId xmlns:a16="http://schemas.microsoft.com/office/drawing/2014/main" id="{D2416523-D734-421A-A512-129362CD38DE}"/>
+                <a16:creationId xmlns:a16="http://schemas.microsoft.com/office/drawing/2014/main" id="{EF64D564-CEDA-4059-A8C0-EB26651D5D0B}"/>
               </a:ext>
             </a:extLst>
           </p:cNvPr>
@@ -29231,8 +29189,8 @@
         </p:blipFill>
         <p:spPr>
           <a:xfrm>
-            <a:off x="1024128" y="1624388"/>
-            <a:ext cx="3067421" cy="337761"/>
+            <a:off x="1024128" y="1748220"/>
+            <a:ext cx="2705239" cy="228612"/>
           </a:xfrm>
           <a:prstGeom prst="rect">
             <a:avLst/>
@@ -29308,49 +29266,31 @@
       </p:sp>
       <p:pic>
         <p:nvPicPr>
-          <p:cNvPr id="1034" name="Picture 10">
+          <p:cNvPr id="6" name="Image 5" descr="Une image contenant capture d’écran&#10;&#10;Description générée automatiquement">
             <a:extLst>
               <a:ext uri="{FF2B5EF4-FFF2-40B4-BE49-F238E27FC236}">
-                <a16:creationId xmlns:a16="http://schemas.microsoft.com/office/drawing/2014/main" id="{BF8E18AB-FD17-47F5-853A-A606A23B8D31}"/>
+                <a16:creationId xmlns:a16="http://schemas.microsoft.com/office/drawing/2014/main" id="{15B30455-901E-40E5-9C79-BFD1C573850D}"/>
               </a:ext>
             </a:extLst>
           </p:cNvPr>
           <p:cNvPicPr>
-            <a:picLocks noChangeAspect="1" noChangeArrowheads="1"/>
+            <a:picLocks noChangeAspect="1"/>
           </p:cNvPicPr>
           <p:nvPr/>
         </p:nvPicPr>
-        <p:blipFill>
-          <a:blip r:embed="rId2">
-            <a:extLst>
-              <a:ext uri="{28A0092B-C50C-407E-A947-70E740481C1C}">
-                <a14:useLocalDpi xmlns:a14="http://schemas.microsoft.com/office/drawing/2010/main" val="0"/>
-              </a:ext>
-            </a:extLst>
-          </a:blip>
-          <a:srcRect/>
-          <a:stretch>
-            <a:fillRect/>
-          </a:stretch>
+        <p:blipFill rotWithShape="1">
+          <a:blip r:embed="rId2"/>
+          <a:srcRect l="10326" r="8601"/>
+          <a:stretch/>
         </p:blipFill>
-        <p:spPr bwMode="auto">
+        <p:spPr>
           <a:xfrm>
-            <a:off x="0" y="1822450"/>
-            <a:ext cx="12192000" cy="4887913"/>
+            <a:off x="104775" y="1837277"/>
+            <a:ext cx="11582400" cy="5357384"/>
           </a:xfrm>
           <a:prstGeom prst="rect">
             <a:avLst/>
           </a:prstGeom>
-          <a:noFill/>
-          <a:extLst>
-            <a:ext uri="{909E8E84-426E-40DD-AFC4-6F175D3DCCD1}">
-              <a14:hiddenFill xmlns:a14="http://schemas.microsoft.com/office/drawing/2010/main">
-                <a:solidFill>
-                  <a:srgbClr val="FFFFFF"/>
-                </a:solidFill>
-              </a14:hiddenFill>
-            </a:ext>
-          </a:extLst>
         </p:spPr>
       </p:pic>
     </p:spTree>
@@ -29422,49 +29362,31 @@
       </p:sp>
       <p:pic>
         <p:nvPicPr>
-          <p:cNvPr id="2050" name="Picture 2">
+          <p:cNvPr id="4" name="Image 3" descr="Une image contenant capture d’écran, dessin&#10;&#10;Description générée automatiquement">
             <a:extLst>
               <a:ext uri="{FF2B5EF4-FFF2-40B4-BE49-F238E27FC236}">
-                <a16:creationId xmlns:a16="http://schemas.microsoft.com/office/drawing/2014/main" id="{5241D2F1-0E2F-4973-8D10-BBE5940017DB}"/>
+                <a16:creationId xmlns:a16="http://schemas.microsoft.com/office/drawing/2014/main" id="{81BA47A3-E099-4942-B008-A8DA8571CC9B}"/>
               </a:ext>
             </a:extLst>
           </p:cNvPr>
           <p:cNvPicPr>
-            <a:picLocks noChangeAspect="1" noChangeArrowheads="1"/>
+            <a:picLocks noChangeAspect="1"/>
           </p:cNvPicPr>
           <p:nvPr/>
         </p:nvPicPr>
-        <p:blipFill>
-          <a:blip r:embed="rId2">
-            <a:extLst>
-              <a:ext uri="{28A0092B-C50C-407E-A947-70E740481C1C}">
-                <a14:useLocalDpi xmlns:a14="http://schemas.microsoft.com/office/drawing/2010/main" val="0"/>
-              </a:ext>
-            </a:extLst>
-          </a:blip>
-          <a:srcRect/>
-          <a:stretch>
-            <a:fillRect/>
-          </a:stretch>
+        <p:blipFill rotWithShape="1">
+          <a:blip r:embed="rId2"/>
+          <a:srcRect t="6716" b="7943"/>
+          <a:stretch/>
         </p:blipFill>
-        <p:spPr bwMode="auto">
+        <p:spPr>
           <a:xfrm>
-            <a:off x="3193098" y="1578864"/>
-            <a:ext cx="6554787" cy="5084698"/>
+            <a:off x="1998980" y="1613326"/>
+            <a:ext cx="8194040" cy="5244674"/>
           </a:xfrm>
           <a:prstGeom prst="rect">
             <a:avLst/>
           </a:prstGeom>
-          <a:noFill/>
-          <a:extLst>
-            <a:ext uri="{909E8E84-426E-40DD-AFC4-6F175D3DCCD1}">
-              <a14:hiddenFill xmlns:a14="http://schemas.microsoft.com/office/drawing/2010/main">
-                <a:solidFill>
-                  <a:srgbClr val="FFFFFF"/>
-                </a:solidFill>
-              </a14:hiddenFill>
-            </a:ext>
-          </a:extLst>
         </p:spPr>
       </p:pic>
     </p:spTree>

</xml_diff>